<commit_message>
update 1 Julky 23
</commit_message>
<xml_diff>
--- a/OMM-Task4.pptx
+++ b/OMM-Task4.pptx
@@ -5,11 +5,13 @@
     <p:sldMasterId id="2147483648" r:id="rId1"/>
   </p:sldMasterIdLst>
   <p:notesMasterIdLst>
-    <p:notesMasterId r:id="rId4"/>
+    <p:notesMasterId r:id="rId6"/>
   </p:notesMasterIdLst>
   <p:sldIdLst>
     <p:sldId id="256" r:id="rId2"/>
-    <p:sldId id="257" r:id="rId3"/>
+    <p:sldId id="259" r:id="rId3"/>
+    <p:sldId id="257" r:id="rId4"/>
+    <p:sldId id="258" r:id="rId5"/>
   </p:sldIdLst>
   <p:sldSz cx="9144000" cy="6858000" type="screen4x3"/>
   <p:notesSz cx="6858000" cy="9144000"/>
@@ -193,7 +195,7 @@
           <a:p>
             <a:fld id="{8ED20E8B-5375-4866-9280-845CC2BA6C2A}" type="datetimeFigureOut">
               <a:rPr lang="fr-FR" smtClean="0"/>
-              <a:t>26/06/2023</a:t>
+              <a:t>01/07/2023</a:t>
             </a:fld>
             <a:endParaRPr lang="fr-FR"/>
           </a:p>
@@ -527,11 +529,39 @@
           <a:p>
             <a:r>
               <a:rPr lang="en-US" baseline="0" dirty="0" smtClean="0"/>
-              <a:t>5 steps with distractors of </a:t>
-            </a:r>
-            <a:r>
-              <a:rPr lang="en-US" baseline="0" smtClean="0"/>
-              <a:t>increasing loudness</a:t>
+              <a:t>5 steps with distractors of increasing </a:t>
+            </a:r>
+            <a:r>
+              <a:rPr lang="en-US" baseline="0" dirty="0" smtClean="0"/>
+              <a:t>loudness</a:t>
+            </a:r>
+          </a:p>
+          <a:p>
+            <a:r>
+              <a:rPr lang="en-US" baseline="0" dirty="0" smtClean="0"/>
+              <a:t>TARGET = </a:t>
+            </a:r>
+            <a:r>
+              <a:rPr lang="en-US" baseline="0" dirty="0" err="1" smtClean="0"/>
+              <a:t>CooA</a:t>
+            </a:r>
+            <a:r>
+              <a:rPr lang="en-US" baseline="0" dirty="0" smtClean="0"/>
+              <a:t>  (Average 16 coos)</a:t>
+            </a:r>
+          </a:p>
+          <a:p>
+            <a:r>
+              <a:rPr lang="en-US" baseline="0" dirty="0" smtClean="0"/>
+              <a:t>DISTRACTOR = </a:t>
+            </a:r>
+            <a:r>
+              <a:rPr lang="en-US" baseline="0" dirty="0" err="1" smtClean="0"/>
+              <a:t>CooB</a:t>
+            </a:r>
+            <a:r>
+              <a:rPr lang="en-US" baseline="0" dirty="0" smtClean="0"/>
+              <a:t> (Random_coo_2.5_0004.wav)</a:t>
             </a:r>
             <a:endParaRPr lang="en-US" baseline="0" dirty="0" smtClean="0"/>
           </a:p>
@@ -555,6 +585,146 @@
             <a:fld id="{15D2D560-4C87-49C4-A793-549D588D90F4}" type="slidenum">
               <a:rPr lang="fr-FR" smtClean="0"/>
               <a:t>1</a:t>
+            </a:fld>
+            <a:endParaRPr lang="fr-FR"/>
+          </a:p>
+        </p:txBody>
+      </p:sp>
+    </p:spTree>
+    <p:extLst>
+      <p:ext uri="{BB962C8B-B14F-4D97-AF65-F5344CB8AC3E}">
+        <p14:creationId xmlns:p14="http://schemas.microsoft.com/office/powerpoint/2010/main" val="3998205015"/>
+      </p:ext>
+    </p:extLst>
+  </p:cSld>
+  <p:clrMapOvr>
+    <a:masterClrMapping/>
+  </p:clrMapOvr>
+</p:notes>
+</file>
+
+<file path=ppt/notesSlides/notesSlide2.xml><?xml version="1.0" encoding="utf-8"?>
+<p:notes xmlns:a="http://schemas.openxmlformats.org/drawingml/2006/main" xmlns:r="http://schemas.openxmlformats.org/officeDocument/2006/relationships" xmlns:p="http://schemas.openxmlformats.org/presentationml/2006/main">
+  <p:cSld>
+    <p:spTree>
+      <p:nvGrpSpPr>
+        <p:cNvPr id="1" name=""/>
+        <p:cNvGrpSpPr/>
+        <p:nvPr/>
+      </p:nvGrpSpPr>
+      <p:grpSpPr>
+        <a:xfrm>
+          <a:off x="0" y="0"/>
+          <a:ext cx="0" cy="0"/>
+          <a:chOff x="0" y="0"/>
+          <a:chExt cx="0" cy="0"/>
+        </a:xfrm>
+      </p:grpSpPr>
+      <p:sp>
+        <p:nvSpPr>
+          <p:cNvPr id="2" name="Slide Image Placeholder 1"/>
+          <p:cNvSpPr>
+            <a:spLocks noGrp="1" noRot="1" noChangeAspect="1"/>
+          </p:cNvSpPr>
+          <p:nvPr>
+            <p:ph type="sldImg"/>
+          </p:nvPr>
+        </p:nvSpPr>
+        <p:spPr/>
+      </p:sp>
+      <p:sp>
+        <p:nvSpPr>
+          <p:cNvPr id="3" name="Notes Placeholder 2"/>
+          <p:cNvSpPr>
+            <a:spLocks noGrp="1"/>
+          </p:cNvSpPr>
+          <p:nvPr>
+            <p:ph type="body" idx="1"/>
+          </p:nvPr>
+        </p:nvSpPr>
+        <p:spPr/>
+        <p:txBody>
+          <a:bodyPr/>
+          <a:lstStyle/>
+          <a:p>
+            <a:r>
+              <a:rPr lang="en-US" dirty="0" smtClean="0"/>
+              <a:t>Here we present 2 consecutive </a:t>
+            </a:r>
+            <a:r>
+              <a:rPr lang="en-US" dirty="0" err="1" smtClean="0"/>
+              <a:t>stim</a:t>
+            </a:r>
+            <a:r>
+              <a:rPr lang="en-US" dirty="0" smtClean="0"/>
+              <a:t> in a random order: one Target, one Distractor</a:t>
+            </a:r>
+          </a:p>
+          <a:p>
+            <a:r>
+              <a:rPr lang="en-US" baseline="0" dirty="0" smtClean="0"/>
+              <a:t>Only the Target is rewarded</a:t>
+            </a:r>
+          </a:p>
+          <a:p>
+            <a:r>
+              <a:rPr lang="en-US" baseline="0" dirty="0" smtClean="0"/>
+              <a:t>5 steps with distractors of increasing </a:t>
+            </a:r>
+            <a:r>
+              <a:rPr lang="en-US" baseline="0" dirty="0" smtClean="0"/>
+              <a:t>loudness</a:t>
+            </a:r>
+          </a:p>
+          <a:p>
+            <a:r>
+              <a:rPr lang="en-US" baseline="0" dirty="0" smtClean="0"/>
+              <a:t>TARGET = </a:t>
+            </a:r>
+            <a:r>
+              <a:rPr lang="en-US" baseline="0" dirty="0" err="1" smtClean="0"/>
+              <a:t>CooA</a:t>
+            </a:r>
+            <a:r>
+              <a:rPr lang="en-US" baseline="0" dirty="0" smtClean="0"/>
+              <a:t>  (Average 16 coos)</a:t>
+            </a:r>
+          </a:p>
+          <a:p>
+            <a:r>
+              <a:rPr lang="en-US" baseline="0" dirty="0" smtClean="0"/>
+              <a:t>DISTRACTOR = </a:t>
+            </a:r>
+            <a:r>
+              <a:rPr lang="en-US" baseline="0" dirty="0" err="1" smtClean="0"/>
+              <a:t>CooB</a:t>
+            </a:r>
+            <a:r>
+              <a:rPr lang="en-US" baseline="0" dirty="0" smtClean="0"/>
+              <a:t> (Random_coo_2.5_0004.wav)</a:t>
+            </a:r>
+            <a:endParaRPr lang="en-US" baseline="0" dirty="0" smtClean="0"/>
+          </a:p>
+        </p:txBody>
+      </p:sp>
+      <p:sp>
+        <p:nvSpPr>
+          <p:cNvPr id="4" name="Slide Number Placeholder 3"/>
+          <p:cNvSpPr>
+            <a:spLocks noGrp="1"/>
+          </p:cNvSpPr>
+          <p:nvPr>
+            <p:ph type="sldNum" sz="quarter" idx="10"/>
+          </p:nvPr>
+        </p:nvSpPr>
+        <p:spPr/>
+        <p:txBody>
+          <a:bodyPr/>
+          <a:lstStyle/>
+          <a:p>
+            <a:fld id="{15D2D560-4C87-49C4-A793-549D588D90F4}" type="slidenum">
+              <a:rPr lang="fr-FR" smtClean="0"/>
+              <a:t>2</a:t>
             </a:fld>
             <a:endParaRPr lang="fr-FR"/>
           </a:p>
@@ -754,7 +924,7 @@
           <a:p>
             <a:fld id="{3CACE2DD-BF9E-4CF2-99F8-8C1D2D4F84CA}" type="datetimeFigureOut">
               <a:rPr lang="fr-FR" smtClean="0"/>
-              <a:t>26/06/2023</a:t>
+              <a:t>01/07/2023</a:t>
             </a:fld>
             <a:endParaRPr lang="fr-FR"/>
           </a:p>
@@ -924,7 +1094,7 @@
           <a:p>
             <a:fld id="{3CACE2DD-BF9E-4CF2-99F8-8C1D2D4F84CA}" type="datetimeFigureOut">
               <a:rPr lang="fr-FR" smtClean="0"/>
-              <a:t>26/06/2023</a:t>
+              <a:t>01/07/2023</a:t>
             </a:fld>
             <a:endParaRPr lang="fr-FR"/>
           </a:p>
@@ -1104,7 +1274,7 @@
           <a:p>
             <a:fld id="{3CACE2DD-BF9E-4CF2-99F8-8C1D2D4F84CA}" type="datetimeFigureOut">
               <a:rPr lang="fr-FR" smtClean="0"/>
-              <a:t>26/06/2023</a:t>
+              <a:t>01/07/2023</a:t>
             </a:fld>
             <a:endParaRPr lang="fr-FR"/>
           </a:p>
@@ -1274,7 +1444,7 @@
           <a:p>
             <a:fld id="{3CACE2DD-BF9E-4CF2-99F8-8C1D2D4F84CA}" type="datetimeFigureOut">
               <a:rPr lang="fr-FR" smtClean="0"/>
-              <a:t>26/06/2023</a:t>
+              <a:t>01/07/2023</a:t>
             </a:fld>
             <a:endParaRPr lang="fr-FR"/>
           </a:p>
@@ -1520,7 +1690,7 @@
           <a:p>
             <a:fld id="{3CACE2DD-BF9E-4CF2-99F8-8C1D2D4F84CA}" type="datetimeFigureOut">
               <a:rPr lang="fr-FR" smtClean="0"/>
-              <a:t>26/06/2023</a:t>
+              <a:t>01/07/2023</a:t>
             </a:fld>
             <a:endParaRPr lang="fr-FR"/>
           </a:p>
@@ -1808,7 +1978,7 @@
           <a:p>
             <a:fld id="{3CACE2DD-BF9E-4CF2-99F8-8C1D2D4F84CA}" type="datetimeFigureOut">
               <a:rPr lang="fr-FR" smtClean="0"/>
-              <a:t>26/06/2023</a:t>
+              <a:t>01/07/2023</a:t>
             </a:fld>
             <a:endParaRPr lang="fr-FR"/>
           </a:p>
@@ -2230,7 +2400,7 @@
           <a:p>
             <a:fld id="{3CACE2DD-BF9E-4CF2-99F8-8C1D2D4F84CA}" type="datetimeFigureOut">
               <a:rPr lang="fr-FR" smtClean="0"/>
-              <a:t>26/06/2023</a:t>
+              <a:t>01/07/2023</a:t>
             </a:fld>
             <a:endParaRPr lang="fr-FR"/>
           </a:p>
@@ -2348,7 +2518,7 @@
           <a:p>
             <a:fld id="{3CACE2DD-BF9E-4CF2-99F8-8C1D2D4F84CA}" type="datetimeFigureOut">
               <a:rPr lang="fr-FR" smtClean="0"/>
-              <a:t>26/06/2023</a:t>
+              <a:t>01/07/2023</a:t>
             </a:fld>
             <a:endParaRPr lang="fr-FR"/>
           </a:p>
@@ -2443,7 +2613,7 @@
           <a:p>
             <a:fld id="{3CACE2DD-BF9E-4CF2-99F8-8C1D2D4F84CA}" type="datetimeFigureOut">
               <a:rPr lang="fr-FR" smtClean="0"/>
-              <a:t>26/06/2023</a:t>
+              <a:t>01/07/2023</a:t>
             </a:fld>
             <a:endParaRPr lang="fr-FR"/>
           </a:p>
@@ -2720,7 +2890,7 @@
           <a:p>
             <a:fld id="{3CACE2DD-BF9E-4CF2-99F8-8C1D2D4F84CA}" type="datetimeFigureOut">
               <a:rPr lang="fr-FR" smtClean="0"/>
-              <a:t>26/06/2023</a:t>
+              <a:t>01/07/2023</a:t>
             </a:fld>
             <a:endParaRPr lang="fr-FR"/>
           </a:p>
@@ -2973,7 +3143,7 @@
           <a:p>
             <a:fld id="{3CACE2DD-BF9E-4CF2-99F8-8C1D2D4F84CA}" type="datetimeFigureOut">
               <a:rPr lang="fr-FR" smtClean="0"/>
-              <a:t>26/06/2023</a:t>
+              <a:t>01/07/2023</a:t>
             </a:fld>
             <a:endParaRPr lang="fr-FR"/>
           </a:p>
@@ -3186,7 +3356,7 @@
           <a:p>
             <a:fld id="{3CACE2DD-BF9E-4CF2-99F8-8C1D2D4F84CA}" type="datetimeFigureOut">
               <a:rPr lang="fr-FR" smtClean="0"/>
-              <a:t>26/06/2023</a:t>
+              <a:t>01/07/2023</a:t>
             </a:fld>
             <a:endParaRPr lang="fr-FR"/>
           </a:p>
@@ -3619,8 +3789,8 @@
         </p:nvSpPr>
         <p:spPr>
           <a:xfrm>
-            <a:off x="3200400" y="0"/>
-            <a:ext cx="2212978" cy="830997"/>
+            <a:off x="3185364" y="0"/>
+            <a:ext cx="2243050" cy="830997"/>
           </a:xfrm>
           <a:prstGeom prst="rect">
             <a:avLst/>
@@ -3642,10 +3812,10 @@
           <a:p>
             <a:pPr algn="ctr"/>
             <a:r>
-              <a:rPr lang="en-US" sz="2400" b="1" dirty="0" smtClean="0"/>
+              <a:rPr lang="en-US" sz="2400" b="1" i="1" dirty="0" smtClean="0"/>
               <a:t>Case Target first</a:t>
             </a:r>
-            <a:endParaRPr lang="fr-FR" sz="2400" b="1" dirty="0"/>
+            <a:endParaRPr lang="fr-FR" sz="2400" b="1" i="1" dirty="0"/>
           </a:p>
         </p:txBody>
       </p:sp>
@@ -4233,10 +4403,10 @@
         </p:nvGrpSpPr>
         <p:grpSpPr>
           <a:xfrm>
-            <a:off x="4692697" y="1905000"/>
-            <a:ext cx="1341265" cy="3520871"/>
-            <a:chOff x="4692697" y="1905000"/>
-            <a:chExt cx="1341265" cy="3520871"/>
+            <a:off x="4692697" y="1789093"/>
+            <a:ext cx="1341265" cy="3636778"/>
+            <a:chOff x="4692697" y="1789093"/>
+            <a:chExt cx="1341265" cy="3636778"/>
           </a:xfrm>
         </p:grpSpPr>
         <p:grpSp>
@@ -4247,10 +4417,10 @@
           </p:nvGrpSpPr>
           <p:grpSpPr>
             <a:xfrm>
-              <a:off x="4692697" y="1905000"/>
-              <a:ext cx="1341265" cy="1676400"/>
-              <a:chOff x="4697669" y="1905000"/>
-              <a:chExt cx="1341265" cy="1676400"/>
+              <a:off x="4692697" y="1789093"/>
+              <a:ext cx="1341265" cy="1792307"/>
+              <a:chOff x="4697669" y="1789093"/>
+              <a:chExt cx="1341265" cy="1792307"/>
             </a:xfrm>
           </p:grpSpPr>
           <p:sp>
@@ -4309,7 +4479,7 @@
             </p:nvSpPr>
             <p:spPr>
               <a:xfrm>
-                <a:off x="4697669" y="1905000"/>
+                <a:off x="4697669" y="1789093"/>
                 <a:ext cx="1341265" cy="954107"/>
               </a:xfrm>
               <a:prstGeom prst="rect">
@@ -4746,10 +4916,10 @@
         </p:nvGrpSpPr>
         <p:grpSpPr>
           <a:xfrm>
-            <a:off x="6368530" y="685800"/>
-            <a:ext cx="1408014" cy="4757967"/>
-            <a:chOff x="7591891" y="685800"/>
-            <a:chExt cx="1408014" cy="4757967"/>
+            <a:off x="6324600" y="1775936"/>
+            <a:ext cx="1408014" cy="3667831"/>
+            <a:chOff x="7547961" y="1775936"/>
+            <a:chExt cx="1408014" cy="3667831"/>
           </a:xfrm>
         </p:grpSpPr>
         <p:cxnSp>
@@ -4798,10 +4968,10 @@
           </p:nvGrpSpPr>
           <p:grpSpPr>
             <a:xfrm>
-              <a:off x="7591891" y="685800"/>
-              <a:ext cx="1408014" cy="2895600"/>
-              <a:chOff x="6881695" y="649934"/>
-              <a:chExt cx="1408014" cy="2895600"/>
+              <a:off x="7547961" y="1775936"/>
+              <a:ext cx="1408014" cy="1805464"/>
+              <a:chOff x="6837765" y="1740070"/>
+              <a:chExt cx="1408014" cy="1805464"/>
             </a:xfrm>
           </p:grpSpPr>
           <p:sp>
@@ -4864,7 +5034,7 @@
             </p:nvSpPr>
             <p:spPr>
               <a:xfrm>
-                <a:off x="6881695" y="649934"/>
+                <a:off x="6837765" y="1740070"/>
                 <a:ext cx="1408014" cy="738664"/>
               </a:xfrm>
               <a:prstGeom prst="rect">
@@ -5290,6 +5460,1737 @@
       </p:grpSpPr>
       <p:sp>
         <p:nvSpPr>
+          <p:cNvPr id="4" name="Rectangle 3"/>
+          <p:cNvSpPr/>
+          <p:nvPr/>
+        </p:nvSpPr>
+        <p:spPr>
+          <a:xfrm>
+            <a:off x="250858" y="2819400"/>
+            <a:ext cx="1143000" cy="798731"/>
+          </a:xfrm>
+          <a:prstGeom prst="rect">
+            <a:avLst/>
+          </a:prstGeom>
+          <a:solidFill>
+            <a:schemeClr val="bg1">
+              <a:lumMod val="75000"/>
+            </a:schemeClr>
+          </a:solidFill>
+          <a:ln>
+            <a:solidFill>
+              <a:schemeClr val="tx1"/>
+            </a:solidFill>
+          </a:ln>
+        </p:spPr>
+        <p:style>
+          <a:lnRef idx="2">
+            <a:schemeClr val="accent1">
+              <a:shade val="50000"/>
+            </a:schemeClr>
+          </a:lnRef>
+          <a:fillRef idx="1">
+            <a:schemeClr val="accent1"/>
+          </a:fillRef>
+          <a:effectRef idx="0">
+            <a:schemeClr val="accent1"/>
+          </a:effectRef>
+          <a:fontRef idx="minor">
+            <a:schemeClr val="lt1"/>
+          </a:fontRef>
+        </p:style>
+        <p:txBody>
+          <a:bodyPr rtlCol="0" anchor="ctr"/>
+          <a:lstStyle/>
+          <a:p>
+            <a:pPr algn="ctr"/>
+            <a:endParaRPr lang="fr-FR"/>
+          </a:p>
+        </p:txBody>
+      </p:sp>
+      <p:sp>
+        <p:nvSpPr>
+          <p:cNvPr id="25" name="TextBox 24"/>
+          <p:cNvSpPr txBox="1"/>
+          <p:nvPr/>
+        </p:nvSpPr>
+        <p:spPr>
+          <a:xfrm>
+            <a:off x="2998262" y="0"/>
+            <a:ext cx="2617256" cy="830997"/>
+          </a:xfrm>
+          <a:prstGeom prst="rect">
+            <a:avLst/>
+          </a:prstGeom>
+          <a:noFill/>
+        </p:spPr>
+        <p:txBody>
+          <a:bodyPr wrap="none" rtlCol="0">
+            <a:spAutoFit/>
+          </a:bodyPr>
+          <a:lstStyle/>
+          <a:p>
+            <a:pPr algn="ctr"/>
+            <a:r>
+              <a:rPr lang="en-US" sz="2400" b="1" dirty="0" smtClean="0"/>
+              <a:t>OMM TASK 4</a:t>
+            </a:r>
+          </a:p>
+          <a:p>
+            <a:pPr algn="ctr"/>
+            <a:r>
+              <a:rPr lang="en-US" sz="2400" b="1" i="1" dirty="0" smtClean="0"/>
+              <a:t>Case Target </a:t>
+            </a:r>
+            <a:r>
+              <a:rPr lang="en-US" sz="2400" b="1" i="1" dirty="0" smtClean="0"/>
+              <a:t>second</a:t>
+            </a:r>
+            <a:endParaRPr lang="fr-FR" sz="2400" b="1" i="1" dirty="0"/>
+          </a:p>
+        </p:txBody>
+      </p:sp>
+      <p:cxnSp>
+        <p:nvCxnSpPr>
+          <p:cNvPr id="28" name="Straight Arrow Connector 27"/>
+          <p:cNvCxnSpPr/>
+          <p:nvPr/>
+        </p:nvCxnSpPr>
+        <p:spPr>
+          <a:xfrm>
+            <a:off x="76200" y="5433407"/>
+            <a:ext cx="8915400" cy="0"/>
+          </a:xfrm>
+          <a:prstGeom prst="straightConnector1">
+            <a:avLst/>
+          </a:prstGeom>
+          <a:ln w="38100">
+            <a:solidFill>
+              <a:schemeClr val="tx1"/>
+            </a:solidFill>
+            <a:tailEnd type="arrow"/>
+          </a:ln>
+        </p:spPr>
+        <p:style>
+          <a:lnRef idx="1">
+            <a:schemeClr val="accent1"/>
+          </a:lnRef>
+          <a:fillRef idx="0">
+            <a:schemeClr val="accent1"/>
+          </a:fillRef>
+          <a:effectRef idx="0">
+            <a:schemeClr val="accent1"/>
+          </a:effectRef>
+          <a:fontRef idx="minor">
+            <a:schemeClr val="tx1"/>
+          </a:fontRef>
+        </p:style>
+      </p:cxnSp>
+      <p:grpSp>
+        <p:nvGrpSpPr>
+          <p:cNvPr id="7" name="Group 6"/>
+          <p:cNvGrpSpPr/>
+          <p:nvPr/>
+        </p:nvGrpSpPr>
+        <p:grpSpPr>
+          <a:xfrm>
+            <a:off x="2758178" y="5295781"/>
+            <a:ext cx="2808495" cy="965775"/>
+            <a:chOff x="3498340" y="5295781"/>
+            <a:chExt cx="4176022" cy="965775"/>
+          </a:xfrm>
+        </p:grpSpPr>
+        <p:cxnSp>
+          <p:nvCxnSpPr>
+            <p:cNvPr id="65" name="Straight Arrow Connector 64"/>
+            <p:cNvCxnSpPr/>
+            <p:nvPr/>
+          </p:nvCxnSpPr>
+          <p:spPr>
+            <a:xfrm flipV="1">
+              <a:off x="3498340" y="5585807"/>
+              <a:ext cx="4176022" cy="2"/>
+            </a:xfrm>
+            <a:prstGeom prst="straightConnector1">
+              <a:avLst/>
+            </a:prstGeom>
+            <a:ln w="28575">
+              <a:solidFill>
+                <a:schemeClr val="tx1"/>
+              </a:solidFill>
+              <a:headEnd type="arrow"/>
+              <a:tailEnd type="arrow"/>
+            </a:ln>
+          </p:spPr>
+          <p:style>
+            <a:lnRef idx="1">
+              <a:schemeClr val="accent1"/>
+            </a:lnRef>
+            <a:fillRef idx="0">
+              <a:schemeClr val="accent1"/>
+            </a:fillRef>
+            <a:effectRef idx="0">
+              <a:schemeClr val="accent1"/>
+            </a:effectRef>
+            <a:fontRef idx="minor">
+              <a:schemeClr val="tx1"/>
+            </a:fontRef>
+          </p:style>
+        </p:cxnSp>
+        <p:sp>
+          <p:nvSpPr>
+            <p:cNvPr id="67" name="TextBox 66"/>
+            <p:cNvSpPr txBox="1"/>
+            <p:nvPr/>
+          </p:nvSpPr>
+          <p:spPr>
+            <a:xfrm>
+              <a:off x="4244556" y="5738336"/>
+              <a:ext cx="2578423" cy="523220"/>
+            </a:xfrm>
+            <a:prstGeom prst="rect">
+              <a:avLst/>
+            </a:prstGeom>
+            <a:noFill/>
+          </p:spPr>
+          <p:txBody>
+            <a:bodyPr wrap="none" rtlCol="0">
+              <a:spAutoFit/>
+            </a:bodyPr>
+            <a:lstStyle/>
+            <a:p>
+              <a:pPr algn="ctr"/>
+              <a:r>
+                <a:rPr lang="en-US" sz="1400" b="1" dirty="0" smtClean="0"/>
+                <a:t>RESPONSE WINDOW</a:t>
+              </a:r>
+            </a:p>
+            <a:p>
+              <a:pPr algn="ctr"/>
+              <a:r>
+                <a:rPr lang="en-US" sz="1400" dirty="0"/>
+                <a:t>1</a:t>
+              </a:r>
+              <a:r>
+                <a:rPr lang="en-US" sz="1400" dirty="0" smtClean="0"/>
+                <a:t>000ms</a:t>
+              </a:r>
+            </a:p>
+          </p:txBody>
+        </p:sp>
+        <p:cxnSp>
+          <p:nvCxnSpPr>
+            <p:cNvPr id="77" name="Straight Connector 76"/>
+            <p:cNvCxnSpPr/>
+            <p:nvPr/>
+          </p:nvCxnSpPr>
+          <p:spPr>
+            <a:xfrm>
+              <a:off x="7661958" y="5295781"/>
+              <a:ext cx="0" cy="152400"/>
+            </a:xfrm>
+            <a:prstGeom prst="line">
+              <a:avLst/>
+            </a:prstGeom>
+            <a:ln w="38100">
+              <a:solidFill>
+                <a:schemeClr val="tx1"/>
+              </a:solidFill>
+            </a:ln>
+          </p:spPr>
+          <p:style>
+            <a:lnRef idx="1">
+              <a:schemeClr val="accent1"/>
+            </a:lnRef>
+            <a:fillRef idx="0">
+              <a:schemeClr val="accent1"/>
+            </a:fillRef>
+            <a:effectRef idx="0">
+              <a:schemeClr val="accent1"/>
+            </a:effectRef>
+            <a:fontRef idx="minor">
+              <a:schemeClr val="tx1"/>
+            </a:fontRef>
+          </p:style>
+        </p:cxnSp>
+      </p:grpSp>
+      <p:grpSp>
+        <p:nvGrpSpPr>
+          <p:cNvPr id="9" name="Group 8"/>
+          <p:cNvGrpSpPr/>
+          <p:nvPr/>
+        </p:nvGrpSpPr>
+        <p:grpSpPr>
+          <a:xfrm>
+            <a:off x="7444157" y="685800"/>
+            <a:ext cx="1703480" cy="4757967"/>
+            <a:chOff x="7444157" y="685800"/>
+            <a:chExt cx="1703480" cy="4757967"/>
+          </a:xfrm>
+        </p:grpSpPr>
+        <p:cxnSp>
+          <p:nvCxnSpPr>
+            <p:cNvPr id="84" name="Straight Connector 83"/>
+            <p:cNvCxnSpPr/>
+            <p:nvPr/>
+          </p:nvCxnSpPr>
+          <p:spPr>
+            <a:xfrm>
+              <a:off x="7650822" y="2259449"/>
+              <a:ext cx="0" cy="3184318"/>
+            </a:xfrm>
+            <a:prstGeom prst="line">
+              <a:avLst/>
+            </a:prstGeom>
+            <a:ln>
+              <a:solidFill>
+                <a:schemeClr val="bg1">
+                  <a:lumMod val="75000"/>
+                </a:schemeClr>
+              </a:solidFill>
+              <a:prstDash val="sysDash"/>
+            </a:ln>
+          </p:spPr>
+          <p:style>
+            <a:lnRef idx="1">
+              <a:schemeClr val="accent1"/>
+            </a:lnRef>
+            <a:fillRef idx="0">
+              <a:schemeClr val="accent1"/>
+            </a:fillRef>
+            <a:effectRef idx="0">
+              <a:schemeClr val="accent1"/>
+            </a:effectRef>
+            <a:fontRef idx="minor">
+              <a:schemeClr val="tx1"/>
+            </a:fontRef>
+          </p:style>
+        </p:cxnSp>
+        <p:grpSp>
+          <p:nvGrpSpPr>
+            <p:cNvPr id="49" name="Group 48"/>
+            <p:cNvGrpSpPr/>
+            <p:nvPr/>
+          </p:nvGrpSpPr>
+          <p:grpSpPr>
+            <a:xfrm>
+              <a:off x="7444157" y="685800"/>
+              <a:ext cx="1703480" cy="1828800"/>
+              <a:chOff x="6733961" y="649934"/>
+              <a:chExt cx="1703480" cy="1828800"/>
+            </a:xfrm>
+          </p:grpSpPr>
+          <p:sp>
+            <p:nvSpPr>
+              <p:cNvPr id="83" name="Rectangle 82"/>
+              <p:cNvSpPr/>
+              <p:nvPr/>
+            </p:nvSpPr>
+            <p:spPr>
+              <a:xfrm>
+                <a:off x="6964166" y="1680003"/>
+                <a:ext cx="1143000" cy="798731"/>
+              </a:xfrm>
+              <a:prstGeom prst="rect">
+                <a:avLst/>
+              </a:prstGeom>
+              <a:solidFill>
+                <a:srgbClr val="00B050"/>
+              </a:solidFill>
+              <a:ln>
+                <a:solidFill>
+                  <a:schemeClr val="tx1"/>
+                </a:solidFill>
+              </a:ln>
+            </p:spPr>
+            <p:style>
+              <a:lnRef idx="2">
+                <a:schemeClr val="accent1">
+                  <a:shade val="50000"/>
+                </a:schemeClr>
+              </a:lnRef>
+              <a:fillRef idx="1">
+                <a:schemeClr val="accent1"/>
+              </a:fillRef>
+              <a:effectRef idx="0">
+                <a:schemeClr val="accent1"/>
+              </a:effectRef>
+              <a:fontRef idx="minor">
+                <a:schemeClr val="lt1"/>
+              </a:fontRef>
+            </p:style>
+            <p:txBody>
+              <a:bodyPr rtlCol="0" anchor="ctr"/>
+              <a:lstStyle/>
+              <a:p>
+                <a:pPr algn="ctr"/>
+                <a:endParaRPr lang="fr-FR">
+                  <a:solidFill>
+                    <a:srgbClr val="00B050"/>
+                  </a:solidFill>
+                </a:endParaRPr>
+              </a:p>
+            </p:txBody>
+          </p:sp>
+          <p:sp>
+            <p:nvSpPr>
+              <p:cNvPr id="94" name="TextBox 93"/>
+              <p:cNvSpPr txBox="1"/>
+              <p:nvPr/>
+            </p:nvSpPr>
+            <p:spPr>
+              <a:xfrm>
+                <a:off x="6733961" y="649934"/>
+                <a:ext cx="1703480" cy="954107"/>
+              </a:xfrm>
+              <a:prstGeom prst="rect">
+                <a:avLst/>
+              </a:prstGeom>
+              <a:noFill/>
+            </p:spPr>
+            <p:txBody>
+              <a:bodyPr wrap="none" rtlCol="0">
+                <a:spAutoFit/>
+              </a:bodyPr>
+              <a:lstStyle/>
+              <a:p>
+                <a:pPr algn="ctr"/>
+                <a:r>
+                  <a:rPr lang="en-US" sz="1400" b="1" dirty="0" smtClean="0"/>
+                  <a:t>NO RESPONSE</a:t>
+                </a:r>
+              </a:p>
+              <a:p>
+                <a:pPr algn="ctr"/>
+                <a:r>
+                  <a:rPr lang="en-US" sz="1400" dirty="0" smtClean="0"/>
+                  <a:t>Aborted trial</a:t>
+                </a:r>
+              </a:p>
+              <a:p>
+                <a:pPr algn="ctr"/>
+                <a:r>
+                  <a:rPr lang="en-US" sz="1400" dirty="0" smtClean="0"/>
+                  <a:t>(not counted in </a:t>
+                </a:r>
+                <a:r>
+                  <a:rPr lang="en-US" sz="1400" dirty="0" err="1" smtClean="0"/>
+                  <a:t>perf</a:t>
+                </a:r>
+                <a:r>
+                  <a:rPr lang="en-US" sz="1400" dirty="0" smtClean="0"/>
+                  <a:t>)</a:t>
+                </a:r>
+              </a:p>
+              <a:p>
+                <a:pPr algn="ctr"/>
+                <a:r>
+                  <a:rPr lang="en-US" sz="1400" dirty="0"/>
+                  <a:t>2-s </a:t>
+                </a:r>
+                <a:r>
+                  <a:rPr lang="en-US" sz="1400" dirty="0" smtClean="0"/>
+                  <a:t>timeout</a:t>
+                </a:r>
+                <a:endParaRPr lang="en-US" sz="1400" dirty="0"/>
+              </a:p>
+            </p:txBody>
+          </p:sp>
+        </p:grpSp>
+      </p:grpSp>
+      <p:grpSp>
+        <p:nvGrpSpPr>
+          <p:cNvPr id="12" name="Group 11"/>
+          <p:cNvGrpSpPr/>
+          <p:nvPr/>
+        </p:nvGrpSpPr>
+        <p:grpSpPr>
+          <a:xfrm>
+            <a:off x="1253473" y="2819400"/>
+            <a:ext cx="1416099" cy="2614007"/>
+            <a:chOff x="1253473" y="2819400"/>
+            <a:chExt cx="1416099" cy="2614007"/>
+          </a:xfrm>
+        </p:grpSpPr>
+        <p:cxnSp>
+          <p:nvCxnSpPr>
+            <p:cNvPr id="31" name="Straight Connector 30"/>
+            <p:cNvCxnSpPr/>
+            <p:nvPr/>
+          </p:nvCxnSpPr>
+          <p:spPr>
+            <a:xfrm>
+              <a:off x="1524000" y="5281007"/>
+              <a:ext cx="0" cy="152400"/>
+            </a:xfrm>
+            <a:prstGeom prst="line">
+              <a:avLst/>
+            </a:prstGeom>
+            <a:ln w="38100">
+              <a:solidFill>
+                <a:schemeClr val="tx1"/>
+              </a:solidFill>
+            </a:ln>
+          </p:spPr>
+          <p:style>
+            <a:lnRef idx="1">
+              <a:schemeClr val="accent1"/>
+            </a:lnRef>
+            <a:fillRef idx="0">
+              <a:schemeClr val="accent1"/>
+            </a:fillRef>
+            <a:effectRef idx="0">
+              <a:schemeClr val="accent1"/>
+            </a:effectRef>
+            <a:fontRef idx="minor">
+              <a:schemeClr val="tx1"/>
+            </a:fontRef>
+          </p:style>
+        </p:cxnSp>
+        <p:grpSp>
+          <p:nvGrpSpPr>
+            <p:cNvPr id="3" name="Group 2"/>
+            <p:cNvGrpSpPr/>
+            <p:nvPr/>
+          </p:nvGrpSpPr>
+          <p:grpSpPr>
+            <a:xfrm>
+              <a:off x="1253473" y="2819400"/>
+              <a:ext cx="1416099" cy="2614007"/>
+              <a:chOff x="1024873" y="2819400"/>
+              <a:chExt cx="1416099" cy="2614007"/>
+            </a:xfrm>
+          </p:grpSpPr>
+          <p:sp>
+            <p:nvSpPr>
+              <p:cNvPr id="27" name="Rectangle 26"/>
+              <p:cNvSpPr/>
+              <p:nvPr/>
+            </p:nvSpPr>
+            <p:spPr>
+              <a:xfrm>
+                <a:off x="1297972" y="2819400"/>
+                <a:ext cx="1143000" cy="798731"/>
+              </a:xfrm>
+              <a:prstGeom prst="rect">
+                <a:avLst/>
+              </a:prstGeom>
+              <a:solidFill>
+                <a:schemeClr val="tx1"/>
+              </a:solidFill>
+              <a:ln>
+                <a:solidFill>
+                  <a:schemeClr val="tx1"/>
+                </a:solidFill>
+              </a:ln>
+            </p:spPr>
+            <p:style>
+              <a:lnRef idx="2">
+                <a:schemeClr val="accent1">
+                  <a:shade val="50000"/>
+                </a:schemeClr>
+              </a:lnRef>
+              <a:fillRef idx="1">
+                <a:schemeClr val="accent1"/>
+              </a:fillRef>
+              <a:effectRef idx="0">
+                <a:schemeClr val="accent1"/>
+              </a:effectRef>
+              <a:fontRef idx="minor">
+                <a:schemeClr val="lt1"/>
+              </a:fontRef>
+            </p:style>
+            <p:txBody>
+              <a:bodyPr rtlCol="0" anchor="ctr"/>
+              <a:lstStyle/>
+              <a:p>
+                <a:pPr algn="ctr"/>
+                <a:endParaRPr lang="fr-FR"/>
+              </a:p>
+            </p:txBody>
+          </p:sp>
+          <p:sp>
+            <p:nvSpPr>
+              <p:cNvPr id="2049" name="TextBox 2048"/>
+              <p:cNvSpPr txBox="1"/>
+              <p:nvPr/>
+            </p:nvSpPr>
+            <p:spPr>
+              <a:xfrm>
+                <a:off x="1024873" y="4955788"/>
+                <a:ext cx="1032527" cy="307777"/>
+              </a:xfrm>
+              <a:prstGeom prst="rect">
+                <a:avLst/>
+              </a:prstGeom>
+              <a:noFill/>
+            </p:spPr>
+            <p:txBody>
+              <a:bodyPr wrap="none" rtlCol="0">
+                <a:spAutoFit/>
+              </a:bodyPr>
+              <a:lstStyle/>
+              <a:p>
+                <a:r>
+                  <a:rPr lang="en-US" sz="1400" b="1" dirty="0" smtClean="0"/>
+                  <a:t>DETECTION</a:t>
+                </a:r>
+                <a:endParaRPr lang="fr-FR" sz="1400" b="1" dirty="0"/>
+              </a:p>
+            </p:txBody>
+          </p:sp>
+          <p:cxnSp>
+            <p:nvCxnSpPr>
+              <p:cNvPr id="34" name="Straight Connector 33"/>
+              <p:cNvCxnSpPr/>
+              <p:nvPr/>
+            </p:nvCxnSpPr>
+            <p:spPr>
+              <a:xfrm flipH="1">
+                <a:off x="1287698" y="3602381"/>
+                <a:ext cx="5137" cy="1831026"/>
+              </a:xfrm>
+              <a:prstGeom prst="line">
+                <a:avLst/>
+              </a:prstGeom>
+              <a:ln>
+                <a:solidFill>
+                  <a:schemeClr val="bg1">
+                    <a:lumMod val="75000"/>
+                  </a:schemeClr>
+                </a:solidFill>
+              </a:ln>
+            </p:spPr>
+            <p:style>
+              <a:lnRef idx="1">
+                <a:schemeClr val="accent1"/>
+              </a:lnRef>
+              <a:fillRef idx="0">
+                <a:schemeClr val="accent1"/>
+              </a:fillRef>
+              <a:effectRef idx="0">
+                <a:schemeClr val="accent1"/>
+              </a:effectRef>
+              <a:fontRef idx="minor">
+                <a:schemeClr val="tx1"/>
+              </a:fontRef>
+            </p:style>
+          </p:cxnSp>
+          <p:sp>
+            <p:nvSpPr>
+              <p:cNvPr id="103" name="Rectangle 102"/>
+              <p:cNvSpPr/>
+              <p:nvPr/>
+            </p:nvSpPr>
+            <p:spPr>
+              <a:xfrm>
+                <a:off x="1651146" y="3047999"/>
+                <a:ext cx="457200" cy="341531"/>
+              </a:xfrm>
+              <a:prstGeom prst="rect">
+                <a:avLst/>
+              </a:prstGeom>
+              <a:solidFill>
+                <a:schemeClr val="bg1"/>
+              </a:solidFill>
+              <a:ln>
+                <a:solidFill>
+                  <a:schemeClr val="tx1"/>
+                </a:solidFill>
+              </a:ln>
+            </p:spPr>
+            <p:style>
+              <a:lnRef idx="2">
+                <a:schemeClr val="accent1">
+                  <a:shade val="50000"/>
+                </a:schemeClr>
+              </a:lnRef>
+              <a:fillRef idx="1">
+                <a:schemeClr val="accent1"/>
+              </a:fillRef>
+              <a:effectRef idx="0">
+                <a:schemeClr val="accent1"/>
+              </a:effectRef>
+              <a:fontRef idx="minor">
+                <a:schemeClr val="lt1"/>
+              </a:fontRef>
+            </p:style>
+            <p:txBody>
+              <a:bodyPr rtlCol="0" anchor="ctr"/>
+              <a:lstStyle/>
+              <a:p>
+                <a:pPr algn="ctr"/>
+                <a:endParaRPr lang="fr-FR"/>
+              </a:p>
+            </p:txBody>
+          </p:sp>
+        </p:grpSp>
+      </p:grpSp>
+      <p:grpSp>
+        <p:nvGrpSpPr>
+          <p:cNvPr id="8" name="Group 7"/>
+          <p:cNvGrpSpPr/>
+          <p:nvPr/>
+        </p:nvGrpSpPr>
+        <p:grpSpPr>
+          <a:xfrm>
+            <a:off x="6202535" y="1752600"/>
+            <a:ext cx="1341265" cy="3673271"/>
+            <a:chOff x="4692697" y="1752600"/>
+            <a:chExt cx="1341265" cy="3673271"/>
+          </a:xfrm>
+        </p:grpSpPr>
+        <p:grpSp>
+          <p:nvGrpSpPr>
+            <p:cNvPr id="47" name="Group 46"/>
+            <p:cNvGrpSpPr/>
+            <p:nvPr/>
+          </p:nvGrpSpPr>
+          <p:grpSpPr>
+            <a:xfrm>
+              <a:off x="4692697" y="1752600"/>
+              <a:ext cx="1341265" cy="1828800"/>
+              <a:chOff x="4697669" y="1752600"/>
+              <a:chExt cx="1341265" cy="1828800"/>
+            </a:xfrm>
+          </p:grpSpPr>
+          <p:sp>
+            <p:nvSpPr>
+              <p:cNvPr id="88" name="Rectangle 87"/>
+              <p:cNvSpPr/>
+              <p:nvPr/>
+            </p:nvSpPr>
+            <p:spPr>
+              <a:xfrm>
+                <a:off x="4800600" y="2782669"/>
+                <a:ext cx="1143000" cy="798731"/>
+              </a:xfrm>
+              <a:prstGeom prst="rect">
+                <a:avLst/>
+              </a:prstGeom>
+              <a:solidFill>
+                <a:schemeClr val="tx1"/>
+              </a:solidFill>
+              <a:ln>
+                <a:solidFill>
+                  <a:schemeClr val="tx1"/>
+                </a:solidFill>
+              </a:ln>
+            </p:spPr>
+            <p:style>
+              <a:lnRef idx="2">
+                <a:schemeClr val="accent1">
+                  <a:shade val="50000"/>
+                </a:schemeClr>
+              </a:lnRef>
+              <a:fillRef idx="1">
+                <a:schemeClr val="accent1"/>
+              </a:fillRef>
+              <a:effectRef idx="0">
+                <a:schemeClr val="accent1"/>
+              </a:effectRef>
+              <a:fontRef idx="minor">
+                <a:schemeClr val="lt1"/>
+              </a:fontRef>
+            </p:style>
+            <p:txBody>
+              <a:bodyPr rtlCol="0" anchor="ctr"/>
+              <a:lstStyle/>
+              <a:p>
+                <a:pPr algn="ctr"/>
+                <a:endParaRPr lang="fr-FR"/>
+              </a:p>
+            </p:txBody>
+          </p:sp>
+          <p:sp>
+            <p:nvSpPr>
+              <p:cNvPr id="96" name="TextBox 95"/>
+              <p:cNvSpPr txBox="1"/>
+              <p:nvPr/>
+            </p:nvSpPr>
+            <p:spPr>
+              <a:xfrm>
+                <a:off x="4697669" y="1752600"/>
+                <a:ext cx="1341265" cy="954107"/>
+              </a:xfrm>
+              <a:prstGeom prst="rect">
+                <a:avLst/>
+              </a:prstGeom>
+              <a:noFill/>
+            </p:spPr>
+            <p:txBody>
+              <a:bodyPr wrap="none" rtlCol="0">
+                <a:spAutoFit/>
+              </a:bodyPr>
+              <a:lstStyle/>
+              <a:p>
+                <a:pPr algn="ctr"/>
+                <a:r>
+                  <a:rPr lang="en-US" sz="1400" b="1" dirty="0" smtClean="0"/>
+                  <a:t>RESPONSE </a:t>
+                </a:r>
+              </a:p>
+              <a:p>
+                <a:pPr algn="ctr"/>
+                <a:r>
+                  <a:rPr lang="en-US" sz="1400" b="1" dirty="0" smtClean="0"/>
+                  <a:t>ON TARGET</a:t>
+                </a:r>
+              </a:p>
+              <a:p>
+                <a:pPr algn="ctr"/>
+                <a:r>
+                  <a:rPr lang="en-US" sz="1400" dirty="0" smtClean="0"/>
+                  <a:t>reward</a:t>
+                </a:r>
+              </a:p>
+              <a:p>
+                <a:pPr algn="ctr"/>
+                <a:r>
+                  <a:rPr lang="en-US" sz="1400" dirty="0"/>
+                  <a:t>2</a:t>
+                </a:r>
+                <a:r>
+                  <a:rPr lang="en-US" sz="1400" dirty="0" smtClean="0"/>
+                  <a:t>-s black screen</a:t>
+                </a:r>
+              </a:p>
+            </p:txBody>
+          </p:sp>
+        </p:grpSp>
+        <p:cxnSp>
+          <p:nvCxnSpPr>
+            <p:cNvPr id="104" name="Straight Connector 103"/>
+            <p:cNvCxnSpPr/>
+            <p:nvPr/>
+          </p:nvCxnSpPr>
+          <p:spPr>
+            <a:xfrm flipH="1">
+              <a:off x="4790326" y="3571126"/>
+              <a:ext cx="10274" cy="1854745"/>
+            </a:xfrm>
+            <a:prstGeom prst="line">
+              <a:avLst/>
+            </a:prstGeom>
+            <a:ln>
+              <a:solidFill>
+                <a:schemeClr val="bg1">
+                  <a:lumMod val="75000"/>
+                </a:schemeClr>
+              </a:solidFill>
+              <a:prstDash val="sysDash"/>
+            </a:ln>
+          </p:spPr>
+          <p:style>
+            <a:lnRef idx="1">
+              <a:schemeClr val="accent1"/>
+            </a:lnRef>
+            <a:fillRef idx="0">
+              <a:schemeClr val="accent1"/>
+            </a:fillRef>
+            <a:effectRef idx="0">
+              <a:schemeClr val="accent1"/>
+            </a:effectRef>
+            <a:fontRef idx="minor">
+              <a:schemeClr val="tx1"/>
+            </a:fontRef>
+          </p:style>
+        </p:cxnSp>
+      </p:grpSp>
+      <p:grpSp>
+        <p:nvGrpSpPr>
+          <p:cNvPr id="48" name="Group 47"/>
+          <p:cNvGrpSpPr/>
+          <p:nvPr/>
+        </p:nvGrpSpPr>
+        <p:grpSpPr>
+          <a:xfrm>
+            <a:off x="2822828" y="3890982"/>
+            <a:ext cx="1352660" cy="1563519"/>
+            <a:chOff x="3503484" y="3849469"/>
+            <a:chExt cx="1352660" cy="1563519"/>
+          </a:xfrm>
+        </p:grpSpPr>
+        <p:sp>
+          <p:nvSpPr>
+            <p:cNvPr id="51" name="TextBox 50"/>
+            <p:cNvSpPr txBox="1"/>
+            <p:nvPr/>
+          </p:nvSpPr>
+          <p:spPr>
+            <a:xfrm>
+              <a:off x="3728656" y="4910279"/>
+              <a:ext cx="1127488" cy="307777"/>
+            </a:xfrm>
+            <a:prstGeom prst="rect">
+              <a:avLst/>
+            </a:prstGeom>
+            <a:noFill/>
+          </p:spPr>
+          <p:txBody>
+            <a:bodyPr wrap="none" rtlCol="0">
+              <a:spAutoFit/>
+            </a:bodyPr>
+            <a:lstStyle/>
+            <a:p>
+              <a:r>
+                <a:rPr lang="en-US" sz="1400" b="1" dirty="0" smtClean="0"/>
+                <a:t>DISTRACTOR</a:t>
+              </a:r>
+              <a:endParaRPr lang="fr-FR" sz="1400" b="1" dirty="0"/>
+            </a:p>
+          </p:txBody>
+        </p:sp>
+        <p:grpSp>
+          <p:nvGrpSpPr>
+            <p:cNvPr id="52" name="Group 51"/>
+            <p:cNvGrpSpPr/>
+            <p:nvPr/>
+          </p:nvGrpSpPr>
+          <p:grpSpPr>
+            <a:xfrm>
+              <a:off x="3503484" y="3849469"/>
+              <a:ext cx="1339596" cy="1563519"/>
+              <a:chOff x="3503484" y="3849469"/>
+              <a:chExt cx="1339596" cy="1563519"/>
+            </a:xfrm>
+          </p:grpSpPr>
+          <p:pic>
+            <p:nvPicPr>
+              <p:cNvPr id="56" name="Picture 2"/>
+              <p:cNvPicPr>
+                <a:picLocks noChangeAspect="1" noChangeArrowheads="1"/>
+              </p:cNvPicPr>
+              <p:nvPr/>
+            </p:nvPicPr>
+            <p:blipFill>
+              <a:blip r:embed="rId3">
+                <a:extLst>
+                  <a:ext uri="{28A0092B-C50C-407E-A947-70E740481C1C}">
+                    <a14:useLocalDpi xmlns:a14="http://schemas.microsoft.com/office/drawing/2010/main" val="0"/>
+                  </a:ext>
+                </a:extLst>
+              </a:blip>
+              <a:srcRect/>
+              <a:stretch>
+                <a:fillRect/>
+              </a:stretch>
+            </p:blipFill>
+            <p:spPr bwMode="auto">
+              <a:xfrm>
+                <a:off x="3504739" y="3849469"/>
+                <a:ext cx="1338341" cy="798731"/>
+              </a:xfrm>
+              <a:prstGeom prst="rect">
+                <a:avLst/>
+              </a:prstGeom>
+              <a:noFill/>
+              <a:ln>
+                <a:noFill/>
+              </a:ln>
+              <a:effectLst/>
+              <a:extLst>
+                <a:ext uri="{909E8E84-426E-40DD-AFC4-6F175D3DCCD1}">
+                  <a14:hiddenFill xmlns:a14="http://schemas.microsoft.com/office/drawing/2010/main">
+                    <a:solidFill>
+                      <a:schemeClr val="accent1"/>
+                    </a:solidFill>
+                  </a14:hiddenFill>
+                </a:ext>
+                <a:ext uri="{91240B29-F687-4F45-9708-019B960494DF}">
+                  <a14:hiddenLine xmlns:a14="http://schemas.microsoft.com/office/drawing/2010/main" w="9525">
+                    <a:solidFill>
+                      <a:schemeClr val="tx1"/>
+                    </a:solidFill>
+                    <a:miter lim="800000"/>
+                    <a:headEnd/>
+                    <a:tailEnd/>
+                  </a14:hiddenLine>
+                </a:ext>
+                <a:ext uri="{AF507438-7753-43E0-B8FC-AC1667EBCBE1}">
+                  <a14:hiddenEffects xmlns:a14="http://schemas.microsoft.com/office/drawing/2010/main">
+                    <a:effectLst>
+                      <a:outerShdw dist="35921" dir="2700000" algn="ctr" rotWithShape="0">
+                        <a:schemeClr val="bg2"/>
+                      </a:outerShdw>
+                    </a:effectLst>
+                  </a14:hiddenEffects>
+                </a:ext>
+              </a:extLst>
+            </p:spPr>
+          </p:pic>
+          <p:cxnSp>
+            <p:nvCxnSpPr>
+              <p:cNvPr id="54" name="Straight Connector 53"/>
+              <p:cNvCxnSpPr/>
+              <p:nvPr/>
+            </p:nvCxnSpPr>
+            <p:spPr>
+              <a:xfrm>
+                <a:off x="3503484" y="4648200"/>
+                <a:ext cx="1716" cy="764788"/>
+              </a:xfrm>
+              <a:prstGeom prst="line">
+                <a:avLst/>
+              </a:prstGeom>
+              <a:ln>
+                <a:solidFill>
+                  <a:schemeClr val="bg1">
+                    <a:lumMod val="75000"/>
+                  </a:schemeClr>
+                </a:solidFill>
+              </a:ln>
+            </p:spPr>
+            <p:style>
+              <a:lnRef idx="1">
+                <a:schemeClr val="accent1"/>
+              </a:lnRef>
+              <a:fillRef idx="0">
+                <a:schemeClr val="accent1"/>
+              </a:fillRef>
+              <a:effectRef idx="0">
+                <a:schemeClr val="accent1"/>
+              </a:effectRef>
+              <a:fontRef idx="minor">
+                <a:schemeClr val="tx1"/>
+              </a:fontRef>
+            </p:style>
+          </p:cxnSp>
+          <p:cxnSp>
+            <p:nvCxnSpPr>
+              <p:cNvPr id="55" name="Straight Connector 54"/>
+              <p:cNvCxnSpPr/>
+              <p:nvPr/>
+            </p:nvCxnSpPr>
+            <p:spPr>
+              <a:xfrm>
+                <a:off x="3515474" y="5257800"/>
+                <a:ext cx="0" cy="152400"/>
+              </a:xfrm>
+              <a:prstGeom prst="line">
+                <a:avLst/>
+              </a:prstGeom>
+              <a:ln w="38100">
+                <a:solidFill>
+                  <a:schemeClr val="tx1"/>
+                </a:solidFill>
+              </a:ln>
+            </p:spPr>
+            <p:style>
+              <a:lnRef idx="1">
+                <a:schemeClr val="accent1"/>
+              </a:lnRef>
+              <a:fillRef idx="0">
+                <a:schemeClr val="accent1"/>
+              </a:fillRef>
+              <a:effectRef idx="0">
+                <a:schemeClr val="accent1"/>
+              </a:effectRef>
+              <a:fontRef idx="minor">
+                <a:schemeClr val="tx1"/>
+              </a:fontRef>
+            </p:style>
+          </p:cxnSp>
+        </p:grpSp>
+      </p:grpSp>
+      <p:grpSp>
+        <p:nvGrpSpPr>
+          <p:cNvPr id="2" name="Group 1"/>
+          <p:cNvGrpSpPr/>
+          <p:nvPr/>
+        </p:nvGrpSpPr>
+        <p:grpSpPr>
+          <a:xfrm>
+            <a:off x="5566673" y="3886200"/>
+            <a:ext cx="1455828" cy="1548054"/>
+            <a:chOff x="5566673" y="3886200"/>
+            <a:chExt cx="1455828" cy="1548054"/>
+          </a:xfrm>
+        </p:grpSpPr>
+        <p:pic>
+          <p:nvPicPr>
+            <p:cNvPr id="37" name="Picture 2"/>
+            <p:cNvPicPr>
+              <a:picLocks noChangeAspect="1" noChangeArrowheads="1"/>
+            </p:cNvPicPr>
+            <p:nvPr/>
+          </p:nvPicPr>
+          <p:blipFill>
+            <a:blip r:embed="rId4" cstate="print">
+              <a:extLst>
+                <a:ext uri="{28A0092B-C50C-407E-A947-70E740481C1C}">
+                  <a14:useLocalDpi xmlns:a14="http://schemas.microsoft.com/office/drawing/2010/main" val="0"/>
+                </a:ext>
+              </a:extLst>
+            </a:blip>
+            <a:srcRect/>
+            <a:stretch>
+              <a:fillRect/>
+            </a:stretch>
+          </p:blipFill>
+          <p:spPr bwMode="auto">
+            <a:xfrm>
+              <a:off x="5566673" y="3886200"/>
+              <a:ext cx="1455828" cy="783626"/>
+            </a:xfrm>
+            <a:prstGeom prst="rect">
+              <a:avLst/>
+            </a:prstGeom>
+            <a:noFill/>
+            <a:ln>
+              <a:noFill/>
+            </a:ln>
+            <a:effectLst/>
+            <a:extLst>
+              <a:ext uri="{909E8E84-426E-40DD-AFC4-6F175D3DCCD1}">
+                <a14:hiddenFill xmlns:a14="http://schemas.microsoft.com/office/drawing/2010/main">
+                  <a:solidFill>
+                    <a:schemeClr val="accent1"/>
+                  </a:solidFill>
+                </a14:hiddenFill>
+              </a:ext>
+              <a:ext uri="{91240B29-F687-4F45-9708-019B960494DF}">
+                <a14:hiddenLine xmlns:a14="http://schemas.microsoft.com/office/drawing/2010/main" w="9525">
+                  <a:solidFill>
+                    <a:schemeClr val="tx1"/>
+                  </a:solidFill>
+                  <a:miter lim="800000"/>
+                  <a:headEnd/>
+                  <a:tailEnd/>
+                </a14:hiddenLine>
+              </a:ext>
+              <a:ext uri="{AF507438-7753-43E0-B8FC-AC1667EBCBE1}">
+                <a14:hiddenEffects xmlns:a14="http://schemas.microsoft.com/office/drawing/2010/main">
+                  <a:effectLst>
+                    <a:outerShdw dist="35921" dir="2700000" algn="ctr" rotWithShape="0">
+                      <a:schemeClr val="bg2"/>
+                    </a:outerShdw>
+                  </a:effectLst>
+                </a14:hiddenEffects>
+              </a:ext>
+            </a:extLst>
+          </p:spPr>
+        </p:pic>
+        <p:cxnSp>
+          <p:nvCxnSpPr>
+            <p:cNvPr id="38" name="Straight Connector 37"/>
+            <p:cNvCxnSpPr/>
+            <p:nvPr/>
+          </p:nvCxnSpPr>
+          <p:spPr>
+            <a:xfrm>
+              <a:off x="5573233" y="4669466"/>
+              <a:ext cx="1716" cy="764788"/>
+            </a:xfrm>
+            <a:prstGeom prst="line">
+              <a:avLst/>
+            </a:prstGeom>
+            <a:ln>
+              <a:solidFill>
+                <a:schemeClr val="bg1">
+                  <a:lumMod val="75000"/>
+                </a:schemeClr>
+              </a:solidFill>
+            </a:ln>
+          </p:spPr>
+          <p:style>
+            <a:lnRef idx="1">
+              <a:schemeClr val="accent1"/>
+            </a:lnRef>
+            <a:fillRef idx="0">
+              <a:schemeClr val="accent1"/>
+            </a:fillRef>
+            <a:effectRef idx="0">
+              <a:schemeClr val="accent1"/>
+            </a:effectRef>
+            <a:fontRef idx="minor">
+              <a:schemeClr val="tx1"/>
+            </a:fontRef>
+          </p:style>
+        </p:cxnSp>
+        <p:sp>
+          <p:nvSpPr>
+            <p:cNvPr id="40" name="TextBox 39"/>
+            <p:cNvSpPr txBox="1"/>
+            <p:nvPr/>
+          </p:nvSpPr>
+          <p:spPr>
+            <a:xfrm>
+              <a:off x="5690436" y="4953000"/>
+              <a:ext cx="757451" cy="307777"/>
+            </a:xfrm>
+            <a:prstGeom prst="rect">
+              <a:avLst/>
+            </a:prstGeom>
+            <a:noFill/>
+          </p:spPr>
+          <p:txBody>
+            <a:bodyPr wrap="none" rtlCol="0">
+              <a:spAutoFit/>
+            </a:bodyPr>
+            <a:lstStyle/>
+            <a:p>
+              <a:r>
+                <a:rPr lang="en-US" sz="1400" b="1" dirty="0" smtClean="0"/>
+                <a:t>TARGET</a:t>
+              </a:r>
+              <a:endParaRPr lang="fr-FR" sz="1400" b="1" dirty="0"/>
+            </a:p>
+          </p:txBody>
+        </p:sp>
+      </p:grpSp>
+      <p:grpSp>
+        <p:nvGrpSpPr>
+          <p:cNvPr id="42" name="Group 41"/>
+          <p:cNvGrpSpPr/>
+          <p:nvPr/>
+        </p:nvGrpSpPr>
+        <p:grpSpPr>
+          <a:xfrm>
+            <a:off x="3733800" y="2004536"/>
+            <a:ext cx="1408014" cy="3439231"/>
+            <a:chOff x="7591891" y="2004536"/>
+            <a:chExt cx="1408014" cy="3439231"/>
+          </a:xfrm>
+        </p:grpSpPr>
+        <p:cxnSp>
+          <p:nvCxnSpPr>
+            <p:cNvPr id="43" name="Straight Connector 42"/>
+            <p:cNvCxnSpPr/>
+            <p:nvPr/>
+          </p:nvCxnSpPr>
+          <p:spPr>
+            <a:xfrm>
+              <a:off x="7650822" y="3571126"/>
+              <a:ext cx="0" cy="1872641"/>
+            </a:xfrm>
+            <a:prstGeom prst="line">
+              <a:avLst/>
+            </a:prstGeom>
+            <a:ln>
+              <a:solidFill>
+                <a:schemeClr val="bg1">
+                  <a:lumMod val="75000"/>
+                </a:schemeClr>
+              </a:solidFill>
+              <a:prstDash val="sysDash"/>
+            </a:ln>
+          </p:spPr>
+          <p:style>
+            <a:lnRef idx="1">
+              <a:schemeClr val="accent1"/>
+            </a:lnRef>
+            <a:fillRef idx="0">
+              <a:schemeClr val="accent1"/>
+            </a:fillRef>
+            <a:effectRef idx="0">
+              <a:schemeClr val="accent1"/>
+            </a:effectRef>
+            <a:fontRef idx="minor">
+              <a:schemeClr val="tx1"/>
+            </a:fontRef>
+          </p:style>
+        </p:cxnSp>
+        <p:grpSp>
+          <p:nvGrpSpPr>
+            <p:cNvPr id="44" name="Group 43"/>
+            <p:cNvGrpSpPr/>
+            <p:nvPr/>
+          </p:nvGrpSpPr>
+          <p:grpSpPr>
+            <a:xfrm>
+              <a:off x="7591891" y="2004536"/>
+              <a:ext cx="1408014" cy="1576864"/>
+              <a:chOff x="6881695" y="1968670"/>
+              <a:chExt cx="1408014" cy="1576864"/>
+            </a:xfrm>
+          </p:grpSpPr>
+          <p:sp>
+            <p:nvSpPr>
+              <p:cNvPr id="45" name="Rectangle 44"/>
+              <p:cNvSpPr/>
+              <p:nvPr/>
+            </p:nvSpPr>
+            <p:spPr>
+              <a:xfrm>
+                <a:off x="6964166" y="2746803"/>
+                <a:ext cx="1143000" cy="798731"/>
+              </a:xfrm>
+              <a:prstGeom prst="rect">
+                <a:avLst/>
+              </a:prstGeom>
+              <a:solidFill>
+                <a:srgbClr val="00B050"/>
+              </a:solidFill>
+              <a:ln>
+                <a:solidFill>
+                  <a:schemeClr val="tx1"/>
+                </a:solidFill>
+              </a:ln>
+            </p:spPr>
+            <p:style>
+              <a:lnRef idx="2">
+                <a:schemeClr val="accent1">
+                  <a:shade val="50000"/>
+                </a:schemeClr>
+              </a:lnRef>
+              <a:fillRef idx="1">
+                <a:schemeClr val="accent1"/>
+              </a:fillRef>
+              <a:effectRef idx="0">
+                <a:schemeClr val="accent1"/>
+              </a:effectRef>
+              <a:fontRef idx="minor">
+                <a:schemeClr val="lt1"/>
+              </a:fontRef>
+            </p:style>
+            <p:txBody>
+              <a:bodyPr rtlCol="0" anchor="ctr"/>
+              <a:lstStyle/>
+              <a:p>
+                <a:pPr algn="ctr"/>
+                <a:endParaRPr lang="fr-FR">
+                  <a:solidFill>
+                    <a:srgbClr val="00B050"/>
+                  </a:solidFill>
+                </a:endParaRPr>
+              </a:p>
+            </p:txBody>
+          </p:sp>
+          <p:sp>
+            <p:nvSpPr>
+              <p:cNvPr id="46" name="TextBox 45"/>
+              <p:cNvSpPr txBox="1"/>
+              <p:nvPr/>
+            </p:nvSpPr>
+            <p:spPr>
+              <a:xfrm>
+                <a:off x="6881695" y="1968670"/>
+                <a:ext cx="1408014" cy="738664"/>
+              </a:xfrm>
+              <a:prstGeom prst="rect">
+                <a:avLst/>
+              </a:prstGeom>
+              <a:noFill/>
+            </p:spPr>
+            <p:txBody>
+              <a:bodyPr wrap="none" rtlCol="0">
+                <a:spAutoFit/>
+              </a:bodyPr>
+              <a:lstStyle/>
+              <a:p>
+                <a:pPr algn="ctr"/>
+                <a:r>
+                  <a:rPr lang="en-US" sz="1400" b="1" dirty="0" smtClean="0"/>
+                  <a:t>RESPONSE</a:t>
+                </a:r>
+              </a:p>
+              <a:p>
+                <a:pPr algn="ctr"/>
+                <a:r>
+                  <a:rPr lang="en-US" sz="1400" b="1" dirty="0" smtClean="0"/>
+                  <a:t>ON DISTRACTOR</a:t>
+                </a:r>
+              </a:p>
+              <a:p>
+                <a:pPr algn="ctr"/>
+                <a:r>
+                  <a:rPr lang="en-US" sz="1400" dirty="0"/>
+                  <a:t>2-s </a:t>
+                </a:r>
+                <a:r>
+                  <a:rPr lang="en-US" sz="1400" dirty="0" smtClean="0"/>
+                  <a:t>timeout</a:t>
+                </a:r>
+                <a:endParaRPr lang="en-US" sz="1400" dirty="0"/>
+              </a:p>
+            </p:txBody>
+          </p:sp>
+        </p:grpSp>
+      </p:grpSp>
+    </p:spTree>
+    <p:extLst>
+      <p:ext uri="{BB962C8B-B14F-4D97-AF65-F5344CB8AC3E}">
+        <p14:creationId xmlns:p14="http://schemas.microsoft.com/office/powerpoint/2010/main" val="2995804914"/>
+      </p:ext>
+    </p:extLst>
+  </p:cSld>
+  <p:clrMapOvr>
+    <a:masterClrMapping/>
+  </p:clrMapOvr>
+  <p:timing>
+    <p:tnLst>
+      <p:par>
+        <p:cTn id="1" dur="indefinite" restart="never" nodeType="tmRoot">
+          <p:childTnLst>
+            <p:seq concurrent="1" nextAc="seek">
+              <p:cTn id="2" dur="indefinite" nodeType="mainSeq">
+                <p:childTnLst>
+                  <p:par>
+                    <p:cTn id="3" fill="hold">
+                      <p:stCondLst>
+                        <p:cond delay="indefinite"/>
+                      </p:stCondLst>
+                      <p:childTnLst>
+                        <p:par>
+                          <p:cTn id="4" fill="hold">
+                            <p:stCondLst>
+                              <p:cond delay="0"/>
+                            </p:stCondLst>
+                            <p:childTnLst>
+                              <p:par>
+                                <p:cTn id="5" presetID="14" presetClass="entr" presetSubtype="10" fill="hold" nodeType="clickEffect">
+                                  <p:stCondLst>
+                                    <p:cond delay="0"/>
+                                  </p:stCondLst>
+                                  <p:childTnLst>
+                                    <p:set>
+                                      <p:cBhvr>
+                                        <p:cTn id="6" dur="1" fill="hold">
+                                          <p:stCondLst>
+                                            <p:cond delay="0"/>
+                                          </p:stCondLst>
+                                        </p:cTn>
+                                        <p:tgtEl>
+                                          <p:spTgt spid="12"/>
+                                        </p:tgtEl>
+                                        <p:attrNameLst>
+                                          <p:attrName>style.visibility</p:attrName>
+                                        </p:attrNameLst>
+                                      </p:cBhvr>
+                                      <p:to>
+                                        <p:strVal val="visible"/>
+                                      </p:to>
+                                    </p:set>
+                                    <p:animEffect transition="in" filter="randombar(horizontal)">
+                                      <p:cBhvr>
+                                        <p:cTn id="7" dur="500"/>
+                                        <p:tgtEl>
+                                          <p:spTgt spid="12"/>
+                                        </p:tgtEl>
+                                      </p:cBhvr>
+                                    </p:animEffect>
+                                  </p:childTnLst>
+                                </p:cTn>
+                              </p:par>
+                            </p:childTnLst>
+                          </p:cTn>
+                        </p:par>
+                      </p:childTnLst>
+                    </p:cTn>
+                  </p:par>
+                  <p:par>
+                    <p:cTn id="8" fill="hold">
+                      <p:stCondLst>
+                        <p:cond delay="indefinite"/>
+                      </p:stCondLst>
+                      <p:childTnLst>
+                        <p:par>
+                          <p:cTn id="9" fill="hold">
+                            <p:stCondLst>
+                              <p:cond delay="0"/>
+                            </p:stCondLst>
+                            <p:childTnLst>
+                              <p:par>
+                                <p:cTn id="10" presetID="14" presetClass="entr" presetSubtype="10" fill="hold" nodeType="clickEffect">
+                                  <p:stCondLst>
+                                    <p:cond delay="0"/>
+                                  </p:stCondLst>
+                                  <p:childTnLst>
+                                    <p:set>
+                                      <p:cBhvr>
+                                        <p:cTn id="11" dur="1" fill="hold">
+                                          <p:stCondLst>
+                                            <p:cond delay="0"/>
+                                          </p:stCondLst>
+                                        </p:cTn>
+                                        <p:tgtEl>
+                                          <p:spTgt spid="48"/>
+                                        </p:tgtEl>
+                                        <p:attrNameLst>
+                                          <p:attrName>style.visibility</p:attrName>
+                                        </p:attrNameLst>
+                                      </p:cBhvr>
+                                      <p:to>
+                                        <p:strVal val="visible"/>
+                                      </p:to>
+                                    </p:set>
+                                    <p:animEffect transition="in" filter="randombar(horizontal)">
+                                      <p:cBhvr>
+                                        <p:cTn id="12" dur="500"/>
+                                        <p:tgtEl>
+                                          <p:spTgt spid="48"/>
+                                        </p:tgtEl>
+                                      </p:cBhvr>
+                                    </p:animEffect>
+                                  </p:childTnLst>
+                                </p:cTn>
+                              </p:par>
+                            </p:childTnLst>
+                          </p:cTn>
+                        </p:par>
+                      </p:childTnLst>
+                    </p:cTn>
+                  </p:par>
+                  <p:par>
+                    <p:cTn id="13" fill="hold">
+                      <p:stCondLst>
+                        <p:cond delay="indefinite"/>
+                      </p:stCondLst>
+                      <p:childTnLst>
+                        <p:par>
+                          <p:cTn id="14" fill="hold">
+                            <p:stCondLst>
+                              <p:cond delay="0"/>
+                            </p:stCondLst>
+                            <p:childTnLst>
+                              <p:par>
+                                <p:cTn id="15" presetID="14" presetClass="entr" presetSubtype="10" fill="hold" nodeType="clickEffect">
+                                  <p:stCondLst>
+                                    <p:cond delay="0"/>
+                                  </p:stCondLst>
+                                  <p:childTnLst>
+                                    <p:set>
+                                      <p:cBhvr>
+                                        <p:cTn id="16" dur="1" fill="hold">
+                                          <p:stCondLst>
+                                            <p:cond delay="0"/>
+                                          </p:stCondLst>
+                                        </p:cTn>
+                                        <p:tgtEl>
+                                          <p:spTgt spid="7"/>
+                                        </p:tgtEl>
+                                        <p:attrNameLst>
+                                          <p:attrName>style.visibility</p:attrName>
+                                        </p:attrNameLst>
+                                      </p:cBhvr>
+                                      <p:to>
+                                        <p:strVal val="visible"/>
+                                      </p:to>
+                                    </p:set>
+                                    <p:animEffect transition="in" filter="randombar(horizontal)">
+                                      <p:cBhvr>
+                                        <p:cTn id="17" dur="500"/>
+                                        <p:tgtEl>
+                                          <p:spTgt spid="7"/>
+                                        </p:tgtEl>
+                                      </p:cBhvr>
+                                    </p:animEffect>
+                                  </p:childTnLst>
+                                </p:cTn>
+                              </p:par>
+                            </p:childTnLst>
+                          </p:cTn>
+                        </p:par>
+                      </p:childTnLst>
+                    </p:cTn>
+                  </p:par>
+                  <p:par>
+                    <p:cTn id="18" fill="hold">
+                      <p:stCondLst>
+                        <p:cond delay="indefinite"/>
+                      </p:stCondLst>
+                      <p:childTnLst>
+                        <p:par>
+                          <p:cTn id="19" fill="hold">
+                            <p:stCondLst>
+                              <p:cond delay="0"/>
+                            </p:stCondLst>
+                            <p:childTnLst>
+                              <p:par>
+                                <p:cTn id="20" presetID="14" presetClass="entr" presetSubtype="10" fill="hold" nodeType="clickEffect">
+                                  <p:stCondLst>
+                                    <p:cond delay="0"/>
+                                  </p:stCondLst>
+                                  <p:childTnLst>
+                                    <p:set>
+                                      <p:cBhvr>
+                                        <p:cTn id="21" dur="1" fill="hold">
+                                          <p:stCondLst>
+                                            <p:cond delay="0"/>
+                                          </p:stCondLst>
+                                        </p:cTn>
+                                        <p:tgtEl>
+                                          <p:spTgt spid="8"/>
+                                        </p:tgtEl>
+                                        <p:attrNameLst>
+                                          <p:attrName>style.visibility</p:attrName>
+                                        </p:attrNameLst>
+                                      </p:cBhvr>
+                                      <p:to>
+                                        <p:strVal val="visible"/>
+                                      </p:to>
+                                    </p:set>
+                                    <p:animEffect transition="in" filter="randombar(horizontal)">
+                                      <p:cBhvr>
+                                        <p:cTn id="22" dur="500"/>
+                                        <p:tgtEl>
+                                          <p:spTgt spid="8"/>
+                                        </p:tgtEl>
+                                      </p:cBhvr>
+                                    </p:animEffect>
+                                  </p:childTnLst>
+                                </p:cTn>
+                              </p:par>
+                            </p:childTnLst>
+                          </p:cTn>
+                        </p:par>
+                      </p:childTnLst>
+                    </p:cTn>
+                  </p:par>
+                  <p:par>
+                    <p:cTn id="23" fill="hold">
+                      <p:stCondLst>
+                        <p:cond delay="indefinite"/>
+                      </p:stCondLst>
+                      <p:childTnLst>
+                        <p:par>
+                          <p:cTn id="24" fill="hold">
+                            <p:stCondLst>
+                              <p:cond delay="0"/>
+                            </p:stCondLst>
+                            <p:childTnLst>
+                              <p:par>
+                                <p:cTn id="25" presetID="14" presetClass="entr" presetSubtype="10" fill="hold" nodeType="clickEffect">
+                                  <p:stCondLst>
+                                    <p:cond delay="0"/>
+                                  </p:stCondLst>
+                                  <p:childTnLst>
+                                    <p:set>
+                                      <p:cBhvr>
+                                        <p:cTn id="26" dur="1" fill="hold">
+                                          <p:stCondLst>
+                                            <p:cond delay="0"/>
+                                          </p:stCondLst>
+                                        </p:cTn>
+                                        <p:tgtEl>
+                                          <p:spTgt spid="9"/>
+                                        </p:tgtEl>
+                                        <p:attrNameLst>
+                                          <p:attrName>style.visibility</p:attrName>
+                                        </p:attrNameLst>
+                                      </p:cBhvr>
+                                      <p:to>
+                                        <p:strVal val="visible"/>
+                                      </p:to>
+                                    </p:set>
+                                    <p:animEffect transition="in" filter="randombar(horizontal)">
+                                      <p:cBhvr>
+                                        <p:cTn id="27" dur="500"/>
+                                        <p:tgtEl>
+                                          <p:spTgt spid="9"/>
+                                        </p:tgtEl>
+                                      </p:cBhvr>
+                                    </p:animEffect>
+                                  </p:childTnLst>
+                                </p:cTn>
+                              </p:par>
+                            </p:childTnLst>
+                          </p:cTn>
+                        </p:par>
+                      </p:childTnLst>
+                    </p:cTn>
+                  </p:par>
+                  <p:par>
+                    <p:cTn id="28" fill="hold">
+                      <p:stCondLst>
+                        <p:cond delay="indefinite"/>
+                      </p:stCondLst>
+                      <p:childTnLst>
+                        <p:par>
+                          <p:cTn id="29" fill="hold">
+                            <p:stCondLst>
+                              <p:cond delay="0"/>
+                            </p:stCondLst>
+                            <p:childTnLst>
+                              <p:par>
+                                <p:cTn id="30" presetID="14" presetClass="entr" presetSubtype="10" fill="hold" nodeType="clickEffect">
+                                  <p:stCondLst>
+                                    <p:cond delay="0"/>
+                                  </p:stCondLst>
+                                  <p:childTnLst>
+                                    <p:set>
+                                      <p:cBhvr>
+                                        <p:cTn id="31" dur="1" fill="hold">
+                                          <p:stCondLst>
+                                            <p:cond delay="0"/>
+                                          </p:stCondLst>
+                                        </p:cTn>
+                                        <p:tgtEl>
+                                          <p:spTgt spid="42"/>
+                                        </p:tgtEl>
+                                        <p:attrNameLst>
+                                          <p:attrName>style.visibility</p:attrName>
+                                        </p:attrNameLst>
+                                      </p:cBhvr>
+                                      <p:to>
+                                        <p:strVal val="visible"/>
+                                      </p:to>
+                                    </p:set>
+                                    <p:animEffect transition="in" filter="randombar(horizontal)">
+                                      <p:cBhvr>
+                                        <p:cTn id="32" dur="500"/>
+                                        <p:tgtEl>
+                                          <p:spTgt spid="42"/>
+                                        </p:tgtEl>
+                                      </p:cBhvr>
+                                    </p:animEffect>
+                                  </p:childTnLst>
+                                </p:cTn>
+                              </p:par>
+                            </p:childTnLst>
+                          </p:cTn>
+                        </p:par>
+                      </p:childTnLst>
+                    </p:cTn>
+                  </p:par>
+                </p:childTnLst>
+              </p:cTn>
+              <p:prevCondLst>
+                <p:cond evt="onPrev" delay="0">
+                  <p:tgtEl>
+                    <p:sldTgt/>
+                  </p:tgtEl>
+                </p:cond>
+              </p:prevCondLst>
+              <p:nextCondLst>
+                <p:cond evt="onNext" delay="0">
+                  <p:tgtEl>
+                    <p:sldTgt/>
+                  </p:tgtEl>
+                </p:cond>
+              </p:nextCondLst>
+            </p:seq>
+            <p:par>
+              <p:cTn id="33"/>
+            </p:par>
+          </p:childTnLst>
+        </p:cTn>
+      </p:par>
+    </p:tnLst>
+  </p:timing>
+</p:sld>
+</file>
+
+<file path=ppt/slides/slide3.xml><?xml version="1.0" encoding="utf-8"?>
+<p:sld xmlns:a="http://schemas.openxmlformats.org/drawingml/2006/main" xmlns:r="http://schemas.openxmlformats.org/officeDocument/2006/relationships" xmlns:p="http://schemas.openxmlformats.org/presentationml/2006/main">
+  <p:cSld>
+    <p:spTree>
+      <p:nvGrpSpPr>
+        <p:cNvPr id="1" name=""/>
+        <p:cNvGrpSpPr/>
+        <p:nvPr/>
+      </p:nvGrpSpPr>
+      <p:grpSpPr>
+        <a:xfrm>
+          <a:off x="0" y="0"/>
+          <a:ext cx="0" cy="0"/>
+          <a:chOff x="0" y="0"/>
+          <a:chExt cx="0" cy="0"/>
+        </a:xfrm>
+      </p:grpSpPr>
+      <p:sp>
+        <p:nvSpPr>
           <p:cNvPr id="2" name="TextBox 1"/>
           <p:cNvSpPr txBox="1"/>
           <p:nvPr/>
@@ -5320,37 +7221,6 @@
       </p:sp>
       <p:sp>
         <p:nvSpPr>
-          <p:cNvPr id="3" name="Title 2"/>
-          <p:cNvSpPr>
-            <a:spLocks noGrp="1"/>
-          </p:cNvSpPr>
-          <p:nvPr>
-            <p:ph type="title"/>
-          </p:nvPr>
-        </p:nvSpPr>
-        <p:spPr/>
-        <p:txBody>
-          <a:bodyPr/>
-          <a:lstStyle/>
-          <a:p>
-            <a:r>
-              <a:rPr lang="fr-FR" dirty="0" smtClean="0"/>
-              <a:t>Variantes </a:t>
-            </a:r>
-            <a:r>
-              <a:rPr lang="fr-FR" dirty="0" err="1" smtClean="0"/>
-              <a:t>Task</a:t>
-            </a:r>
-            <a:r>
-              <a:rPr lang="fr-FR" dirty="0" smtClean="0"/>
-              <a:t> 4</a:t>
-            </a:r>
-            <a:endParaRPr lang="fr-FR" dirty="0"/>
-          </a:p>
-        </p:txBody>
-      </p:sp>
-      <p:sp>
-        <p:nvSpPr>
           <p:cNvPr id="4" name="Content Placeholder 3"/>
           <p:cNvSpPr>
             <a:spLocks noGrp="1"/>
@@ -5359,24 +7229,29 @@
             <p:ph idx="1"/>
           </p:nvPr>
         </p:nvSpPr>
-        <p:spPr/>
+        <p:spPr>
+          <a:xfrm>
+            <a:off x="457200" y="609600"/>
+            <a:ext cx="8229600" cy="4525963"/>
+          </a:xfrm>
+        </p:spPr>
         <p:txBody>
           <a:bodyPr>
-            <a:normAutofit/>
+            <a:normAutofit fontScale="92500" lnSpcReduction="20000"/>
           </a:bodyPr>
           <a:lstStyle/>
           <a:p>
             <a:r>
               <a:rPr lang="fr-FR" sz="2800" dirty="0" smtClean="0"/>
-              <a:t>Toujours 1 cible (</a:t>
-            </a:r>
-            <a:r>
-              <a:rPr lang="fr-FR" sz="2800" dirty="0" err="1" smtClean="0"/>
-              <a:t>CooA</a:t>
+              <a:t>Toujours 1 cible </a:t>
             </a:r>
             <a:r>
               <a:rPr lang="fr-FR" sz="2800" dirty="0" smtClean="0"/>
-              <a:t>), nombre grandissant de </a:t>
+              <a:t>(Avg16), </a:t>
+            </a:r>
+            <a:r>
+              <a:rPr lang="fr-FR" sz="2800" dirty="0" smtClean="0"/>
+              <a:t>nombre grandissant de </a:t>
             </a:r>
             <a:r>
               <a:rPr lang="fr-FR" sz="2800" dirty="0" err="1" smtClean="0"/>
@@ -5387,7 +7262,7 @@
           <a:p>
             <a:r>
               <a:rPr lang="fr-FR" sz="2800" dirty="0" smtClean="0"/>
-              <a:t>Task4: 1 cible, 1 </a:t>
+              <a:t>Task4: 1 </a:t>
             </a:r>
             <a:r>
               <a:rPr lang="fr-FR" sz="2800" dirty="0" err="1" smtClean="0"/>
@@ -5402,18 +7277,22 @@
               <a:t>(</a:t>
             </a:r>
             <a:r>
-              <a:rPr lang="fr-FR" sz="2800" dirty="0" err="1" smtClean="0"/>
-              <a:t>CooB</a:t>
-            </a:r>
-            <a:r>
               <a:rPr lang="fr-FR" sz="2800" dirty="0" smtClean="0"/>
-              <a:t>): 5 niveaux de volume (niveau 5: même niveau sonore)</a:t>
-            </a:r>
-          </a:p>
-          <a:p>
+              <a:t>Coo_01): </a:t>
+            </a:r>
             <a:r>
               <a:rPr lang="fr-FR" sz="2800" dirty="0" smtClean="0"/>
-              <a:t>Task4_1: 1 cible , 2 </a:t>
+              <a:t>5 niveaux de volume (niveau 5: même niveau sonore)</a:t>
+            </a:r>
+          </a:p>
+          <a:p>
+            <a:r>
+              <a:rPr lang="fr-FR" sz="2800" dirty="0" smtClean="0"/>
+              <a:t>Task4_1: </a:t>
+            </a:r>
+            <a:r>
+              <a:rPr lang="fr-FR" sz="2800" dirty="0" smtClean="0"/>
+              <a:t>2 </a:t>
             </a:r>
             <a:r>
               <a:rPr lang="fr-FR" sz="2800" dirty="0" err="1" smtClean="0"/>
@@ -5421,29 +7300,22 @@
             </a:r>
             <a:r>
               <a:rPr lang="fr-FR" sz="2800" dirty="0" smtClean="0"/>
-              <a:t> (</a:t>
-            </a:r>
-            <a:r>
-              <a:rPr lang="fr-FR" sz="2800" dirty="0" err="1" smtClean="0"/>
-              <a:t>CooB</a:t>
+              <a:t> </a:t>
             </a:r>
             <a:r>
               <a:rPr lang="fr-FR" sz="2800" dirty="0" smtClean="0"/>
-              <a:t>, </a:t>
-            </a:r>
-            <a:r>
-              <a:rPr lang="fr-FR" sz="2800" dirty="0" err="1" smtClean="0"/>
-              <a:t>CooC</a:t>
-            </a:r>
+              <a:t>(Coo_01, Coo_02)</a:t>
+            </a:r>
+            <a:endParaRPr lang="fr-FR" sz="2800" dirty="0" smtClean="0"/>
+          </a:p>
+          <a:p>
             <a:r>
               <a:rPr lang="fr-FR" sz="2800" dirty="0" smtClean="0"/>
-              <a:t>)</a:t>
-            </a:r>
-          </a:p>
-          <a:p>
+              <a:t>Task4_2: </a:t>
+            </a:r>
             <a:r>
               <a:rPr lang="fr-FR" sz="2800" dirty="0" smtClean="0"/>
-              <a:t>Task4_2: 1 cible, 4 </a:t>
+              <a:t>4 </a:t>
             </a:r>
             <a:r>
               <a:rPr lang="fr-FR" sz="2800" dirty="0" err="1" smtClean="0"/>
@@ -5451,21 +7323,18 @@
             </a:r>
             <a:r>
               <a:rPr lang="fr-FR" sz="2800" dirty="0" smtClean="0"/>
-              <a:t>(</a:t>
-            </a:r>
-            <a:r>
-              <a:rPr lang="fr-FR" sz="2800" dirty="0" err="1" smtClean="0"/>
-              <a:t>CooB</a:t>
-            </a:r>
+              <a:t>(Coo_01-&gt;04)</a:t>
+            </a:r>
+            <a:endParaRPr lang="fr-FR" sz="2800" dirty="0" smtClean="0"/>
+          </a:p>
+          <a:p>
             <a:r>
               <a:rPr lang="fr-FR" sz="2800" dirty="0" smtClean="0"/>
-              <a:t>, C, D, E)</a:t>
-            </a:r>
-          </a:p>
-          <a:p>
+              <a:t>Task4_3: </a:t>
+            </a:r>
             <a:r>
               <a:rPr lang="fr-FR" sz="2800" dirty="0" smtClean="0"/>
-              <a:t>Task4_3: 1 cible, 4 </a:t>
+              <a:t>16 </a:t>
             </a:r>
             <a:r>
               <a:rPr lang="fr-FR" sz="2800" dirty="0" err="1" smtClean="0"/>
@@ -5473,23 +7342,65 @@
             </a:r>
             <a:r>
               <a:rPr lang="fr-FR" sz="2800" dirty="0" smtClean="0"/>
-              <a:t> (COOB et 3 </a:t>
-            </a:r>
-            <a:r>
-              <a:rPr lang="fr-FR" sz="2800" dirty="0" err="1" smtClean="0"/>
-              <a:t>morphs</a:t>
+              <a:t> </a:t>
             </a:r>
             <a:r>
               <a:rPr lang="fr-FR" sz="2800" dirty="0" smtClean="0"/>
+              <a:t>(Coo_01-&gt;Coo_16)</a:t>
+            </a:r>
+          </a:p>
+          <a:p>
+            <a:r>
+              <a:rPr lang="en-US" sz="2800" dirty="0" smtClean="0"/>
+              <a:t>Task4_4: 16 </a:t>
+            </a:r>
+            <a:r>
+              <a:rPr lang="en-US" sz="2800" dirty="0" err="1" smtClean="0"/>
+              <a:t>distracteurs</a:t>
+            </a:r>
+            <a:r>
+              <a:rPr lang="en-US" sz="2800" dirty="0" smtClean="0"/>
+              <a:t> ( Morph 25, 50, 75, 100% pour Coos: 08, 12, 15 et 16)</a:t>
+            </a:r>
+          </a:p>
+          <a:p>
+            <a:r>
+              <a:rPr lang="en-US" sz="2800" dirty="0" smtClean="0"/>
+              <a:t>Task4_5: 16 </a:t>
+            </a:r>
+            <a:r>
+              <a:rPr lang="en-US" sz="2800" dirty="0" err="1" smtClean="0"/>
+              <a:t>distracteurs</a:t>
+            </a:r>
+            <a:r>
+              <a:rPr lang="en-US" sz="2800" dirty="0" smtClean="0"/>
+              <a:t> ( Morph 25, 50, 75, 100 avec AVGf0 </a:t>
+            </a:r>
+            <a:r>
+              <a:rPr lang="en-US" sz="2800" dirty="0" err="1" smtClean="0"/>
+              <a:t>ou</a:t>
+            </a:r>
+            <a:r>
+              <a:rPr lang="en-US" sz="2800" dirty="0" smtClean="0"/>
               <a:t> </a:t>
             </a:r>
             <a:r>
-              <a:rPr lang="fr-FR" sz="2800" dirty="0" err="1" smtClean="0"/>
-              <a:t>CooA-CooB</a:t>
-            </a:r>
-            <a:r>
-              <a:rPr lang="fr-FR" sz="2800" dirty="0" smtClean="0"/>
-              <a:t>)</a:t>
+              <a:rPr lang="en-US" sz="2800" dirty="0" err="1" smtClean="0"/>
+              <a:t>avgF</a:t>
+            </a:r>
+            <a:r>
+              <a:rPr lang="en-US" sz="2800" dirty="0" smtClean="0"/>
+              <a:t>; Coo 12 et Coo 15)</a:t>
+            </a:r>
+          </a:p>
+          <a:p>
+            <a:r>
+              <a:rPr lang="en-US" sz="2800" dirty="0" smtClean="0"/>
+              <a:t>Blocks de 64 </a:t>
+            </a:r>
+            <a:r>
+              <a:rPr lang="en-US" sz="2800" dirty="0" err="1" smtClean="0"/>
+              <a:t>essais</a:t>
             </a:r>
             <a:endParaRPr lang="fr-FR" sz="2800" dirty="0"/>
           </a:p>
@@ -5499,6 +7410,161 @@
     <p:extLst>
       <p:ext uri="{BB962C8B-B14F-4D97-AF65-F5344CB8AC3E}">
         <p14:creationId xmlns:p14="http://schemas.microsoft.com/office/powerpoint/2010/main" val="2144138731"/>
+      </p:ext>
+    </p:extLst>
+  </p:cSld>
+  <p:clrMapOvr>
+    <a:masterClrMapping/>
+  </p:clrMapOvr>
+</p:sld>
+</file>
+
+<file path=ppt/slides/slide4.xml><?xml version="1.0" encoding="utf-8"?>
+<p:sld xmlns:a="http://schemas.openxmlformats.org/drawingml/2006/main" xmlns:r="http://schemas.openxmlformats.org/officeDocument/2006/relationships" xmlns:p="http://schemas.openxmlformats.org/presentationml/2006/main">
+  <p:cSld>
+    <p:spTree>
+      <p:nvGrpSpPr>
+        <p:cNvPr id="1" name=""/>
+        <p:cNvGrpSpPr/>
+        <p:nvPr/>
+      </p:nvGrpSpPr>
+      <p:grpSpPr>
+        <a:xfrm>
+          <a:off x="0" y="0"/>
+          <a:ext cx="0" cy="0"/>
+          <a:chOff x="0" y="0"/>
+          <a:chExt cx="0" cy="0"/>
+        </a:xfrm>
+      </p:grpSpPr>
+      <p:sp>
+        <p:nvSpPr>
+          <p:cNvPr id="2" name="Title 1"/>
+          <p:cNvSpPr>
+            <a:spLocks noGrp="1"/>
+          </p:cNvSpPr>
+          <p:nvPr>
+            <p:ph type="title"/>
+          </p:nvPr>
+        </p:nvSpPr>
+        <p:spPr/>
+        <p:txBody>
+          <a:bodyPr/>
+          <a:lstStyle/>
+          <a:p>
+            <a:endParaRPr lang="fr-FR"/>
+          </a:p>
+        </p:txBody>
+      </p:sp>
+      <p:sp>
+        <p:nvSpPr>
+          <p:cNvPr id="3" name="Content Placeholder 2"/>
+          <p:cNvSpPr>
+            <a:spLocks noGrp="1"/>
+          </p:cNvSpPr>
+          <p:nvPr>
+            <p:ph idx="1"/>
+          </p:nvPr>
+        </p:nvSpPr>
+        <p:spPr>
+          <a:xfrm>
+            <a:off x="457200" y="4876800"/>
+            <a:ext cx="8229600" cy="1249363"/>
+          </a:xfrm>
+        </p:spPr>
+        <p:txBody>
+          <a:bodyPr>
+            <a:normAutofit fontScale="85000" lnSpcReduction="20000"/>
+          </a:bodyPr>
+          <a:lstStyle/>
+          <a:p>
+            <a:r>
+              <a:rPr lang="en-US" dirty="0" smtClean="0"/>
+              <a:t>Selection of 4 coos for morphing with AVG</a:t>
+            </a:r>
+          </a:p>
+          <a:p>
+            <a:r>
+              <a:rPr lang="en-US" dirty="0" smtClean="0"/>
+              <a:t>(both F and f0 cues)</a:t>
+            </a:r>
+          </a:p>
+          <a:p>
+            <a:r>
+              <a:rPr lang="en-US" dirty="0" smtClean="0"/>
+              <a:t>Coo_15, Coo_08, Coo_12, Coo_16</a:t>
+            </a:r>
+            <a:endParaRPr lang="fr-FR" dirty="0"/>
+          </a:p>
+        </p:txBody>
+      </p:sp>
+      <p:pic>
+        <p:nvPicPr>
+          <p:cNvPr id="1027" name="Picture 3"/>
+          <p:cNvPicPr>
+            <a:picLocks noChangeAspect="1" noChangeArrowheads="1"/>
+          </p:cNvPicPr>
+          <p:nvPr/>
+        </p:nvPicPr>
+        <p:blipFill>
+          <a:blip r:embed="rId2">
+            <a:extLst>
+              <a:ext uri="{28A0092B-C50C-407E-A947-70E740481C1C}">
+                <a14:useLocalDpi xmlns:a14="http://schemas.microsoft.com/office/drawing/2010/main" val="0"/>
+              </a:ext>
+            </a:extLst>
+          </a:blip>
+          <a:srcRect/>
+          <a:stretch>
+            <a:fillRect/>
+          </a:stretch>
+        </p:blipFill>
+        <p:spPr bwMode="auto">
+          <a:xfrm>
+            <a:off x="838200" y="76200"/>
+            <a:ext cx="6858000" cy="4774990"/>
+          </a:xfrm>
+          <a:prstGeom prst="rect">
+            <a:avLst/>
+          </a:prstGeom>
+          <a:noFill/>
+          <a:ln>
+            <a:noFill/>
+          </a:ln>
+          <a:effectLst/>
+          <a:extLst>
+            <a:ext uri="{909E8E84-426E-40DD-AFC4-6F175D3DCCD1}">
+              <a14:hiddenFill xmlns:a14="http://schemas.microsoft.com/office/drawing/2010/main">
+                <a:solidFill>
+                  <a:schemeClr val="accent1"/>
+                </a:solidFill>
+              </a14:hiddenFill>
+            </a:ext>
+            <a:ext uri="{91240B29-F687-4F45-9708-019B960494DF}">
+              <a14:hiddenLine xmlns:a14="http://schemas.microsoft.com/office/drawing/2010/main" w="9525">
+                <a:solidFill>
+                  <a:schemeClr val="tx1"/>
+                </a:solidFill>
+                <a:miter lim="800000"/>
+                <a:headEnd/>
+                <a:tailEnd/>
+              </a14:hiddenLine>
+            </a:ext>
+            <a:ext uri="{AF507438-7753-43E0-B8FC-AC1667EBCBE1}">
+              <a14:hiddenEffects xmlns:a14="http://schemas.microsoft.com/office/drawing/2010/main">
+                <a:effectLst>
+                  <a:outerShdw dist="35921" dir="2700000" algn="ctr" rotWithShape="0">
+                    <a:schemeClr val="bg2"/>
+                  </a:outerShdw>
+                </a:effectLst>
+              </a14:hiddenEffects>
+            </a:ext>
+          </a:extLst>
+        </p:spPr>
+      </p:pic>
+    </p:spTree>
+    <p:extLst>
+      <p:ext uri="{BB962C8B-B14F-4D97-AF65-F5344CB8AC3E}">
+        <p14:creationId xmlns:p14="http://schemas.microsoft.com/office/powerpoint/2010/main" val="1551525585"/>
       </p:ext>
     </p:extLst>
   </p:cSld>

</xml_diff>